<commit_message>
add offset for matview
</commit_message>
<xml_diff>
--- a/Мои_факапс_юрлов.pptx
+++ b/Мои_факапс_юрлов.pptx
@@ -5100,16 +5100,19 @@
           <a:p>
             <a:r>
               <a:rPr lang="ru-RU" dirty="0"/>
-              <a:t>не сделал, т.к. оказывается </a:t>
-            </a:r>
-            <a:r>
-              <a:rPr lang="ru-RU" dirty="0" err="1"/>
-              <a:t>кликхаус</a:t>
-            </a:r>
-            <a:r>
-              <a:rPr lang="ru-RU" dirty="0"/>
-              <a:t> не может так, ну или пока не может</a:t>
-            </a:r>
+              <a:t>сделал, при помощи </a:t>
+            </a:r>
+            <a:endParaRPr lang="en-US" dirty="0"/>
+          </a:p>
+          <a:p>
+            <a:pPr marL="0" indent="0">
+              <a:buNone/>
+            </a:pPr>
+            <a:r>
+              <a:rPr lang="en-US" dirty="0"/>
+              <a:t>refresh every 1 week offset 5 day 7 hour</a:t>
+            </a:r>
+            <a:endParaRPr lang="ru-RU" dirty="0"/>
           </a:p>
           <a:p>
             <a:pPr marL="0" indent="0">

</xml_diff>